<commit_message>
Added more commenting to classes that were empty
</commit_message>
<xml_diff>
--- a/docs/presentatie.pptx
+++ b/docs/presentatie.pptx
@@ -21,7 +21,7 @@
     <p:sldId id="265" r:id="rId9"/>
     <p:sldId id="261" r:id="rId10"/>
     <p:sldId id="262" r:id="rId11"/>
-    <p:sldId id="266" r:id="rId12"/>
+    <p:sldId id="267" r:id="rId12"/>
   </p:sldIdLst>
   <p:sldSz cx="18288000" cy="10287000"/>
   <p:notesSz cx="9144000" cy="6858000"/>
@@ -149,6 +149,9 @@
         </p15:guide>
       </p15:sldGuideLst>
     </p:ext>
+    <p:ext uri="{2D200454-40CA-4A62-9FC3-DE9A4176ACB9}">
+      <p15:notesGuideLst xmlns:p15="http://schemas.microsoft.com/office/powerpoint/2012/main"/>
+    </p:ext>
   </p:extLst>
 </p:presentation>
 </file>
@@ -247,7 +250,7 @@
           <a:p>
             <a:fld id="{AF9058C4-FFBB-3741-B247-3DE5D19B634B}" type="datetimeFigureOut">
               <a:rPr lang="nl-NL" smtClean="0"/>
-              <a:t>25-06-2024</a:t>
+              <a:t>27-06-2024</a:t>
             </a:fld>
             <a:endParaRPr lang="nl-NL"/>
           </a:p>
@@ -425,7 +428,7 @@
           <a:p>
             <a:fld id="{DE4F96C3-9A87-5043-AD41-26E0EBF0E1BB}" type="datetimeFigureOut">
               <a:rPr lang="nl-NL" smtClean="0"/>
-              <a:t>25-06-2024</a:t>
+              <a:t>27-06-2024</a:t>
             </a:fld>
             <a:endParaRPr lang="nl-NL"/>
           </a:p>
@@ -956,7 +959,7 @@
           <a:p>
             <a:fld id="{EC31685E-33CA-4A4F-865E-F27396E4A38D}" type="datetime1">
               <a:rPr lang="nl-NL" smtClean="0"/>
-              <a:t>25-06-2024</a:t>
+              <a:t>27-06-2024</a:t>
             </a:fld>
             <a:endParaRPr lang="en-US"/>
           </a:p>
@@ -1120,7 +1123,7 @@
           <a:p>
             <a:fld id="{D605FBC6-7A1B-0C4A-A9CF-6956DEF46DF8}" type="datetime1">
               <a:rPr lang="nl-NL" smtClean="0"/>
-              <a:t>25-06-2024</a:t>
+              <a:t>27-06-2024</a:t>
             </a:fld>
             <a:endParaRPr lang="en-US"/>
           </a:p>
@@ -1294,7 +1297,7 @@
           <a:p>
             <a:fld id="{0B7753AE-9935-D447-8289-AE3E28EC2900}" type="datetime1">
               <a:rPr lang="nl-NL" smtClean="0"/>
-              <a:t>25-06-2024</a:t>
+              <a:t>27-06-2024</a:t>
             </a:fld>
             <a:endParaRPr lang="en-US"/>
           </a:p>
@@ -1463,7 +1466,7 @@
           <a:p>
             <a:fld id="{D49951D8-6A7D-294A-B914-6D8CDF4017A4}" type="datetime1">
               <a:rPr lang="nl-NL" smtClean="0"/>
-              <a:t>25-06-2024</a:t>
+              <a:t>27-06-2024</a:t>
             </a:fld>
             <a:endParaRPr lang="en-US"/>
           </a:p>
@@ -1704,7 +1707,7 @@
           <a:p>
             <a:fld id="{7A9E891C-D049-3540-B63E-5CAA85F93B41}" type="datetime1">
               <a:rPr lang="nl-NL" smtClean="0"/>
-              <a:t>25-06-2024</a:t>
+              <a:t>27-06-2024</a:t>
             </a:fld>
             <a:endParaRPr lang="en-US"/>
           </a:p>
@@ -1985,7 +1988,7 @@
           <a:p>
             <a:fld id="{DA75DF7D-7459-CC4C-90A3-8003BFF4716E}" type="datetime1">
               <a:rPr lang="nl-NL" smtClean="0"/>
-              <a:t>25-06-2024</a:t>
+              <a:t>27-06-2024</a:t>
             </a:fld>
             <a:endParaRPr lang="en-US"/>
           </a:p>
@@ -2400,7 +2403,7 @@
           <a:p>
             <a:fld id="{6BB93BAC-922C-F549-9639-D921C74FE79F}" type="datetime1">
               <a:rPr lang="nl-NL" smtClean="0"/>
-              <a:t>25-06-2024</a:t>
+              <a:t>27-06-2024</a:t>
             </a:fld>
             <a:endParaRPr lang="en-US"/>
           </a:p>
@@ -2513,7 +2516,7 @@
           <a:p>
             <a:fld id="{DE868DD7-C473-5B4E-B0BA-EBC9FFE787E4}" type="datetime1">
               <a:rPr lang="nl-NL" smtClean="0"/>
-              <a:t>25-06-2024</a:t>
+              <a:t>27-06-2024</a:t>
             </a:fld>
             <a:endParaRPr lang="en-US"/>
           </a:p>
@@ -2604,7 +2607,7 @@
           <a:p>
             <a:fld id="{42B2C659-E7F6-8441-BB0D-174BB7EA34B9}" type="datetime1">
               <a:rPr lang="nl-NL" smtClean="0"/>
-              <a:t>25-06-2024</a:t>
+              <a:t>27-06-2024</a:t>
             </a:fld>
             <a:endParaRPr lang="en-US"/>
           </a:p>
@@ -2642,14 +2645,22 @@
         <p:spPr/>
         <p:txBody>
           <a:bodyPr/>
-          <a:lstStyle/>
+          <a:lstStyle>
+            <a:lvl1pPr>
+              <a:defRPr sz="2800">
+                <a:solidFill>
+                  <a:schemeClr val="tx1"/>
+                </a:solidFill>
+              </a:defRPr>
+            </a:lvl1pPr>
+          </a:lstStyle>
           <a:p>
             <a:fld id="{B6F15528-21DE-4FAA-801E-634DDDAF4B2B}" type="slidenum">
               <a:rPr lang="en-US" smtClean="0"/>
               <a:pPr/>
               <a:t>‹nr.›</a:t>
             </a:fld>
-            <a:endParaRPr lang="en-US"/>
+            <a:endParaRPr lang="en-US" dirty="0"/>
           </a:p>
         </p:txBody>
       </p:sp>
@@ -2875,7 +2886,7 @@
           <a:p>
             <a:fld id="{C59520F1-E8F6-CC43-BE38-F70F3CA1ACFD}" type="datetime1">
               <a:rPr lang="nl-NL" smtClean="0"/>
-              <a:t>25-06-2024</a:t>
+              <a:t>27-06-2024</a:t>
             </a:fld>
             <a:endParaRPr lang="en-US"/>
           </a:p>
@@ -3123,7 +3134,7 @@
           <a:p>
             <a:fld id="{F64F13F6-0F58-6D43-8DD9-3EA894E16508}" type="datetime1">
               <a:rPr lang="nl-NL" smtClean="0"/>
-              <a:t>25-06-2024</a:t>
+              <a:t>27-06-2024</a:t>
             </a:fld>
             <a:endParaRPr lang="en-US"/>
           </a:p>
@@ -3335,7 +3346,7 @@
           <a:p>
             <a:fld id="{351C0A7F-441D-F340-B0CE-5802B53B7DD9}" type="datetime1">
               <a:rPr lang="nl-NL" smtClean="0"/>
-              <a:t>25-06-2024</a:t>
+              <a:t>27-06-2024</a:t>
             </a:fld>
             <a:endParaRPr lang="en-US"/>
           </a:p>
@@ -4120,8 +4131,8 @@
         </p:nvGrpSpPr>
         <p:grpSpPr>
           <a:xfrm>
-            <a:off x="9274166" y="3708525"/>
-            <a:ext cx="8456948" cy="4850803"/>
+            <a:off x="9274166" y="4152900"/>
+            <a:ext cx="8456948" cy="4406428"/>
             <a:chOff x="0" y="0"/>
             <a:chExt cx="7981950" cy="4578350"/>
           </a:xfrm>
@@ -4446,56 +4457,6 @@
             </a:p>
           </p:txBody>
         </p:sp>
-        <p:sp>
-          <p:nvSpPr>
-            <p:cNvPr id="16" name="Freeform 16"/>
-            <p:cNvSpPr/>
-            <p:nvPr/>
-          </p:nvSpPr>
-          <p:spPr>
-            <a:xfrm>
-              <a:off x="962660" y="276860"/>
-              <a:ext cx="6055360" cy="3789680"/>
-            </a:xfrm>
-            <a:custGeom>
-              <a:avLst/>
-              <a:gdLst/>
-              <a:ahLst/>
-              <a:cxnLst/>
-              <a:rect l="l" t="t" r="r" b="b"/>
-              <a:pathLst>
-                <a:path w="6055360" h="3789680">
-                  <a:moveTo>
-                    <a:pt x="0" y="0"/>
-                  </a:moveTo>
-                  <a:lnTo>
-                    <a:pt x="6055360" y="0"/>
-                  </a:lnTo>
-                  <a:lnTo>
-                    <a:pt x="6055360" y="3789680"/>
-                  </a:lnTo>
-                  <a:lnTo>
-                    <a:pt x="0" y="3789680"/>
-                  </a:lnTo>
-                  <a:close/>
-                </a:path>
-              </a:pathLst>
-            </a:custGeom>
-            <a:blipFill>
-              <a:blip r:embed="rId3"/>
-              <a:stretch>
-                <a:fillRect l="-5322" t="-6825" r="-5582" b="-12067"/>
-              </a:stretch>
-            </a:blipFill>
-          </p:spPr>
-          <p:txBody>
-            <a:bodyPr/>
-            <a:lstStyle/>
-            <a:p>
-              <a:endParaRPr lang="nl-NL"/>
-            </a:p>
-          </p:txBody>
-        </p:sp>
       </p:grpSp>
       <p:sp>
         <p:nvSpPr>
@@ -4536,7 +4497,7 @@
             </a:pathLst>
           </a:custGeom>
           <a:blipFill>
-            <a:blip r:embed="rId4"/>
+            <a:blip r:embed="rId3"/>
             <a:stretch>
               <a:fillRect/>
             </a:stretch>
@@ -4580,6 +4541,41 @@
           </a:p>
         </p:txBody>
       </p:sp>
+      <p:pic>
+        <p:nvPicPr>
+          <p:cNvPr id="19" name="Afbeelding 18" descr="Afbeelding met tekst, schermopname, software&#10;&#10;Automatisch gegenereerde beschrijving">
+            <a:extLst>
+              <a:ext uri="{FF2B5EF4-FFF2-40B4-BE49-F238E27FC236}">
+                <a16:creationId xmlns:a16="http://schemas.microsoft.com/office/drawing/2014/main" id="{B1F06340-33E4-7A4E-FC0E-D353B761A21F}"/>
+              </a:ext>
+            </a:extLst>
+          </p:cNvPr>
+          <p:cNvPicPr>
+            <a:picLocks noChangeAspect="1"/>
+          </p:cNvPicPr>
+          <p:nvPr/>
+        </p:nvPicPr>
+        <p:blipFill rotWithShape="1">
+          <a:blip r:embed="rId4">
+            <a:extLst>
+              <a:ext uri="{28A0092B-C50C-407E-A947-70E740481C1C}">
+                <a14:useLocalDpi xmlns:a14="http://schemas.microsoft.com/office/drawing/2010/main" val="0"/>
+              </a:ext>
+            </a:extLst>
+          </a:blip>
+          <a:srcRect l="4707" t="5910" r="5145" b="10975"/>
+          <a:stretch/>
+        </p:blipFill>
+        <p:spPr>
+          <a:xfrm>
+            <a:off x="10294112" y="4406954"/>
+            <a:ext cx="6415709" cy="3681925"/>
+          </a:xfrm>
+          <a:prstGeom prst="rect">
+            <a:avLst/>
+          </a:prstGeom>
+        </p:spPr>
+      </p:pic>
     </p:spTree>
   </p:cSld>
   <p:clrMapOvr>
@@ -5361,7 +5357,7 @@
                 </a:solidFill>
                 <a:latin typeface="Poppins"/>
               </a:rPr>
-              <a:t> </a:t>
+              <a:t>, </a:t>
             </a:r>
             <a:r>
               <a:rPr lang="en-US" sz="2442" spc="-48" dirty="0" err="1">
@@ -5982,7 +5978,7 @@
         <p:spPr>
           <a:xfrm>
             <a:off x="1235804" y="5840286"/>
-            <a:ext cx="7366063" cy="501556"/>
+            <a:ext cx="7366063" cy="981166"/>
           </a:xfrm>
           <a:prstGeom prst="rect">
             <a:avLst/>
@@ -6003,13 +5999,41 @@
               </a:spcBef>
             </a:pPr>
             <a:r>
-              <a:rPr lang="en-US" sz="2753" spc="-55">
-                <a:solidFill>
-                  <a:srgbClr val="051D40"/>
-                </a:solidFill>
-                <a:latin typeface="Poppins"/>
-              </a:rPr>
-              <a:t>Sibren Reekers &amp; Mark van de Streek</a:t>
+              <a:rPr lang="en-US" sz="2753" spc="-55" dirty="0" err="1">
+                <a:solidFill>
+                  <a:srgbClr val="051D40"/>
+                </a:solidFill>
+                <a:latin typeface="Poppins"/>
+              </a:rPr>
+              <a:t>Sibren</a:t>
+            </a:r>
+            <a:r>
+              <a:rPr lang="en-US" sz="2753" spc="-55" dirty="0">
+                <a:solidFill>
+                  <a:srgbClr val="051D40"/>
+                </a:solidFill>
+                <a:latin typeface="Poppins"/>
+              </a:rPr>
+              <a:t> Reekers &amp; Mark van de Streek</a:t>
+            </a:r>
+          </a:p>
+          <a:p>
+            <a:pPr algn="l">
+              <a:lnSpc>
+                <a:spcPts val="3855"/>
+              </a:lnSpc>
+              <a:spcBef>
+                <a:spcPct val="0"/>
+              </a:spcBef>
+            </a:pPr>
+            <a:r>
+              <a:rPr lang="en-US" sz="2753" spc="-55" dirty="0">
+                <a:solidFill>
+                  <a:srgbClr val="051D40"/>
+                </a:solidFill>
+                <a:latin typeface="Poppins"/>
+              </a:rPr>
+              <a:t>Bio-informatica</a:t>
             </a:r>
           </a:p>
         </p:txBody>
@@ -6024,8 +6048,8 @@
         </p:nvGrpSpPr>
         <p:grpSpPr>
           <a:xfrm>
-            <a:off x="9274166" y="3708525"/>
-            <a:ext cx="8456948" cy="4850803"/>
+            <a:off x="9274166" y="4152900"/>
+            <a:ext cx="8456948" cy="4406428"/>
             <a:chOff x="0" y="0"/>
             <a:chExt cx="7981950" cy="4578350"/>
           </a:xfrm>
@@ -6350,56 +6374,6 @@
             </a:p>
           </p:txBody>
         </p:sp>
-        <p:sp>
-          <p:nvSpPr>
-            <p:cNvPr id="16" name="Freeform 16"/>
-            <p:cNvSpPr/>
-            <p:nvPr/>
-          </p:nvSpPr>
-          <p:spPr>
-            <a:xfrm>
-              <a:off x="962660" y="276860"/>
-              <a:ext cx="6055360" cy="3789680"/>
-            </a:xfrm>
-            <a:custGeom>
-              <a:avLst/>
-              <a:gdLst/>
-              <a:ahLst/>
-              <a:cxnLst/>
-              <a:rect l="l" t="t" r="r" b="b"/>
-              <a:pathLst>
-                <a:path w="6055360" h="3789680">
-                  <a:moveTo>
-                    <a:pt x="0" y="0"/>
-                  </a:moveTo>
-                  <a:lnTo>
-                    <a:pt x="6055360" y="0"/>
-                  </a:lnTo>
-                  <a:lnTo>
-                    <a:pt x="6055360" y="3789680"/>
-                  </a:lnTo>
-                  <a:lnTo>
-                    <a:pt x="0" y="3789680"/>
-                  </a:lnTo>
-                  <a:close/>
-                </a:path>
-              </a:pathLst>
-            </a:custGeom>
-            <a:blipFill>
-              <a:blip r:embed="rId3"/>
-              <a:stretch>
-                <a:fillRect l="-5322" t="-6825" r="-5582" b="-12067"/>
-              </a:stretch>
-            </a:blipFill>
-          </p:spPr>
-          <p:txBody>
-            <a:bodyPr/>
-            <a:lstStyle/>
-            <a:p>
-              <a:endParaRPr lang="nl-NL"/>
-            </a:p>
-          </p:txBody>
-        </p:sp>
       </p:grpSp>
       <p:sp>
         <p:nvSpPr>
@@ -6440,7 +6414,7 @@
             </a:pathLst>
           </a:custGeom>
           <a:blipFill>
-            <a:blip r:embed="rId4"/>
+            <a:blip r:embed="rId3"/>
             <a:stretch>
               <a:fillRect/>
             </a:stretch>
@@ -6456,10 +6430,10 @@
       </p:sp>
       <p:sp>
         <p:nvSpPr>
-          <p:cNvPr id="22" name="Tijdelijke aanduiding voor dianummer 21">
+          <p:cNvPr id="26" name="Tijdelijke aanduiding voor dianummer 25">
             <a:extLst>
               <a:ext uri="{FF2B5EF4-FFF2-40B4-BE49-F238E27FC236}">
-                <a16:creationId xmlns:a16="http://schemas.microsoft.com/office/drawing/2014/main" id="{2042C923-97B4-A140-5139-0559068C178D}"/>
+                <a16:creationId xmlns:a16="http://schemas.microsoft.com/office/drawing/2014/main" id="{492B20C2-90AD-2B61-A4CD-73FC81AFC741}"/>
               </a:ext>
             </a:extLst>
           </p:cNvPr>
@@ -6484,10 +6458,45 @@
           </a:p>
         </p:txBody>
       </p:sp>
+      <p:pic>
+        <p:nvPicPr>
+          <p:cNvPr id="19" name="Afbeelding 18" descr="Afbeelding met tekst, schermopname, software&#10;&#10;Automatisch gegenereerde beschrijving">
+            <a:extLst>
+              <a:ext uri="{FF2B5EF4-FFF2-40B4-BE49-F238E27FC236}">
+                <a16:creationId xmlns:a16="http://schemas.microsoft.com/office/drawing/2014/main" id="{B1F06340-33E4-7A4E-FC0E-D353B761A21F}"/>
+              </a:ext>
+            </a:extLst>
+          </p:cNvPr>
+          <p:cNvPicPr>
+            <a:picLocks noChangeAspect="1"/>
+          </p:cNvPicPr>
+          <p:nvPr/>
+        </p:nvPicPr>
+        <p:blipFill rotWithShape="1">
+          <a:blip r:embed="rId4">
+            <a:extLst>
+              <a:ext uri="{28A0092B-C50C-407E-A947-70E740481C1C}">
+                <a14:useLocalDpi xmlns:a14="http://schemas.microsoft.com/office/drawing/2010/main" val="0"/>
+              </a:ext>
+            </a:extLst>
+          </a:blip>
+          <a:srcRect l="4707" t="5910" r="5145" b="10975"/>
+          <a:stretch/>
+        </p:blipFill>
+        <p:spPr>
+          <a:xfrm>
+            <a:off x="10294112" y="4406954"/>
+            <a:ext cx="6415709" cy="3681925"/>
+          </a:xfrm>
+          <a:prstGeom prst="rect">
+            <a:avLst/>
+          </a:prstGeom>
+        </p:spPr>
+      </p:pic>
     </p:spTree>
     <p:extLst>
       <p:ext uri="{BB962C8B-B14F-4D97-AF65-F5344CB8AC3E}">
-        <p14:creationId xmlns:p14="http://schemas.microsoft.com/office/powerpoint/2010/main" val="2898473325"/>
+        <p14:creationId xmlns:p14="http://schemas.microsoft.com/office/powerpoint/2010/main" val="2232861784"/>
       </p:ext>
     </p:extLst>
   </p:cSld>
@@ -10177,6 +10186,33 @@
             </a:r>
           </a:p>
           <a:p>
+            <a:pPr marL="606518" lvl="1" indent="-342900">
+              <a:lnSpc>
+                <a:spcPts val="3418"/>
+              </a:lnSpc>
+              <a:spcBef>
+                <a:spcPct val="0"/>
+              </a:spcBef>
+              <a:buFont typeface="Arial" panose="020B0604020202020204" pitchFamily="34" charset="0"/>
+              <a:buChar char="•"/>
+            </a:pPr>
+            <a:r>
+              <a:rPr lang="nl-NL" sz="2442" spc="-48" dirty="0">
+                <a:solidFill>
+                  <a:srgbClr val="051D40"/>
+                </a:solidFill>
+                <a:latin typeface="Poppins"/>
+              </a:rPr>
+              <a:t>Apparaat toevoegen op een aparte pagina</a:t>
+            </a:r>
+            <a:endParaRPr lang="nl-NL" sz="2442" u="none" strike="noStrike" spc="-48" dirty="0">
+              <a:solidFill>
+                <a:srgbClr val="051D40"/>
+              </a:solidFill>
+              <a:latin typeface="Poppins"/>
+            </a:endParaRPr>
+          </a:p>
+          <a:p>
             <a:pPr marL="606518" lvl="1" indent="-342900" algn="l">
               <a:lnSpc>
                 <a:spcPts val="3418"/>
@@ -10243,27 +10279,6 @@
                 <a:latin typeface="Poppins"/>
               </a:rPr>
               <a:t>kst toevoegen bij een uitleenverzoek</a:t>
-            </a:r>
-          </a:p>
-          <a:p>
-            <a:pPr marL="606518" lvl="1" indent="-342900" algn="l">
-              <a:lnSpc>
-                <a:spcPts val="3418"/>
-              </a:lnSpc>
-              <a:spcBef>
-                <a:spcPct val="0"/>
-              </a:spcBef>
-              <a:buFont typeface="Arial" panose="020B0604020202020204" pitchFamily="34" charset="0"/>
-              <a:buChar char="•"/>
-            </a:pPr>
-            <a:r>
-              <a:rPr lang="nl-NL" sz="2442" spc="-48" dirty="0">
-                <a:solidFill>
-                  <a:srgbClr val="051D40"/>
-                </a:solidFill>
-                <a:latin typeface="Poppins"/>
-              </a:rPr>
-              <a:t>Apparaat toevoegen op een aparte pagina</a:t>
             </a:r>
           </a:p>
           <a:p>
@@ -10504,14 +10519,14 @@
         <p:spPr>
           <a:xfrm>
             <a:off x="1609132" y="1222804"/>
-            <a:ext cx="7922504" cy="771523"/>
+            <a:ext cx="10506668" cy="754950"/>
           </a:xfrm>
           <a:prstGeom prst="rect">
             <a:avLst/>
           </a:prstGeom>
         </p:spPr>
         <p:txBody>
-          <a:bodyPr lIns="0" tIns="0" rIns="0" bIns="0" rtlCol="0" anchor="t">
+          <a:bodyPr wrap="square" lIns="0" tIns="0" rIns="0" bIns="0" rtlCol="0" anchor="t">
             <a:spAutoFit/>
           </a:bodyPr>
           <a:lstStyle/>
@@ -10560,12 +10575,15 @@
               </a:rPr>
               <a:t>eindproduct</a:t>
             </a:r>
-            <a:endParaRPr lang="en-US" sz="4500" dirty="0">
-              <a:solidFill>
-                <a:srgbClr val="051D40"/>
-              </a:solidFill>
-              <a:latin typeface="Open Sans Extra Bold"/>
-            </a:endParaRPr>
+            <a:r>
+              <a:rPr lang="en-US" sz="4500" dirty="0">
+                <a:solidFill>
+                  <a:srgbClr val="051D40"/>
+                </a:solidFill>
+                <a:latin typeface="Open Sans Extra Bold"/>
+              </a:rPr>
+              <a:t> – back end</a:t>
+            </a:r>
           </a:p>
         </p:txBody>
       </p:sp>
@@ -11182,7 +11200,7 @@
         <p:spPr>
           <a:xfrm>
             <a:off x="1600432" y="2861709"/>
-            <a:ext cx="11608230" cy="4001416"/>
+            <a:ext cx="11608230" cy="3565400"/>
           </a:xfrm>
           <a:prstGeom prst="rect">
             <a:avLst/>
@@ -11354,27 +11372,6 @@
                 <a:latin typeface="Poppins"/>
               </a:rPr>
               <a:t>’</a:t>
-            </a:r>
-          </a:p>
-          <a:p>
-            <a:pPr marL="527237" lvl="1" indent="-263619" algn="l">
-              <a:lnSpc>
-                <a:spcPts val="3418"/>
-              </a:lnSpc>
-              <a:spcBef>
-                <a:spcPct val="0"/>
-              </a:spcBef>
-              <a:buFont typeface="Arial"/>
-              <a:buChar char="•"/>
-            </a:pPr>
-            <a:r>
-              <a:rPr lang="nl-NL" sz="2442" spc="-48" dirty="0">
-                <a:solidFill>
-                  <a:srgbClr val="051D40"/>
-                </a:solidFill>
-                <a:latin typeface="Poppins"/>
-              </a:rPr>
-              <a:t>Toepassen huisstijl</a:t>
             </a:r>
           </a:p>
           <a:p>
@@ -12048,7 +12045,7 @@
         <p:spPr>
           <a:xfrm>
             <a:off x="1600432" y="2861709"/>
-            <a:ext cx="11608230" cy="4437433"/>
+            <a:ext cx="11608230" cy="5745484"/>
           </a:xfrm>
           <a:prstGeom prst="rect">
             <a:avLst/>
@@ -12252,22 +12249,13 @@
               <a:buChar char="•"/>
             </a:pPr>
             <a:r>
-              <a:rPr lang="nl-NL" sz="2442" u="none" strike="noStrike" spc="-48" dirty="0">
-                <a:solidFill>
-                  <a:srgbClr val="051D40"/>
-                </a:solidFill>
-                <a:latin typeface="Poppins"/>
-              </a:rPr>
-              <a:t>Uitleenve</a:t>
-            </a:r>
-            <a:r>
               <a:rPr lang="nl-NL" sz="2442" spc="-48" dirty="0">
                 <a:solidFill>
                   <a:srgbClr val="051D40"/>
                 </a:solidFill>
                 <a:latin typeface="Poppins"/>
               </a:rPr>
-              <a:t>rzoek + ‘goedkeur’ pagina</a:t>
+              <a:t>Meldingen</a:t>
             </a:r>
           </a:p>
           <a:p>
@@ -12288,8 +12276,86 @@
                 </a:solidFill>
                 <a:latin typeface="Poppins"/>
               </a:rPr>
+              <a:t>Uitleenve</a:t>
+            </a:r>
+            <a:r>
+              <a:rPr lang="nl-NL" sz="2442" spc="-48" dirty="0">
+                <a:solidFill>
+                  <a:srgbClr val="051D40"/>
+                </a:solidFill>
+                <a:latin typeface="Poppins"/>
+              </a:rPr>
+              <a:t>rzoek + ‘goedkeur’ pagina</a:t>
+            </a:r>
+          </a:p>
+          <a:p>
+            <a:pPr marL="527237" lvl="1" indent="-263619">
+              <a:lnSpc>
+                <a:spcPts val="3418"/>
+              </a:lnSpc>
+              <a:spcBef>
+                <a:spcPct val="0"/>
+              </a:spcBef>
+              <a:buFont typeface="Arial"/>
+              <a:buChar char="•"/>
+            </a:pPr>
+            <a:r>
+              <a:rPr lang="nl-NL" sz="2442" spc="-48" dirty="0">
+                <a:solidFill>
+                  <a:srgbClr val="051D40"/>
+                </a:solidFill>
+                <a:latin typeface="Poppins"/>
+              </a:rPr>
+              <a:t>Toepassen huisstijl</a:t>
+            </a:r>
+          </a:p>
+          <a:p>
+            <a:pPr marL="527237" lvl="1" indent="-263619" algn="l">
+              <a:lnSpc>
+                <a:spcPts val="3418"/>
+              </a:lnSpc>
+              <a:spcBef>
+                <a:spcPct val="0"/>
+              </a:spcBef>
+              <a:buFont typeface="Arial"/>
+              <a:buChar char="•"/>
+            </a:pPr>
+            <a:r>
+              <a:rPr lang="nl-NL" sz="2442" u="none" strike="noStrike" spc="-48" dirty="0">
+                <a:solidFill>
+                  <a:srgbClr val="051D40"/>
+                </a:solidFill>
+                <a:latin typeface="Poppins"/>
+              </a:rPr>
               <a:t>Loginpagina + Tokens</a:t>
             </a:r>
+          </a:p>
+          <a:p>
+            <a:pPr marL="527237" lvl="1" indent="-263619" algn="l">
+              <a:lnSpc>
+                <a:spcPts val="3418"/>
+              </a:lnSpc>
+              <a:spcBef>
+                <a:spcPct val="0"/>
+              </a:spcBef>
+              <a:buFont typeface="Arial"/>
+              <a:buChar char="•"/>
+            </a:pPr>
+            <a:r>
+              <a:rPr lang="nl-NL" sz="2442" spc="-48" dirty="0">
+                <a:solidFill>
+                  <a:srgbClr val="051D40"/>
+                </a:solidFill>
+                <a:latin typeface="Poppins"/>
+              </a:rPr>
+              <a:t>Styling, styling en nog meer styling</a:t>
+            </a:r>
+            <a:endParaRPr lang="nl-NL" sz="2442" u="none" strike="noStrike" spc="-48" dirty="0">
+              <a:solidFill>
+                <a:srgbClr val="051D40"/>
+              </a:solidFill>
+              <a:latin typeface="Poppins"/>
+            </a:endParaRPr>
           </a:p>
         </p:txBody>
       </p:sp>

</xml_diff>